<commit_message>
Add new handson: create-ec2-and-login-by-ssm.md
</commit_message>
<xml_diff>
--- a/SinglePublicVPC/images/picture.pptx
+++ b/SinglePublicVPC/images/picture.pptx
@@ -259,7 +259,7 @@
           <a:p>
             <a:fld id="{DC1B431B-AAC3-1A49-9FAA-44192FD8B1A5}" type="datetimeFigureOut">
               <a:rPr kumimoji="1" lang="ja-JP" altLang="en-US" smtClean="0"/>
-              <a:t>2019/2/15</a:t>
+              <a:t>2019/2/16</a:t>
             </a:fld>
             <a:endParaRPr kumimoji="1" lang="ja-JP" altLang="en-US"/>
           </a:p>
@@ -464,7 +464,7 @@
           <a:p>
             <a:fld id="{DC1B431B-AAC3-1A49-9FAA-44192FD8B1A5}" type="datetimeFigureOut">
               <a:rPr kumimoji="1" lang="ja-JP" altLang="en-US" smtClean="0"/>
-              <a:t>2019/2/15</a:t>
+              <a:t>2019/2/16</a:t>
             </a:fld>
             <a:endParaRPr kumimoji="1" lang="ja-JP" altLang="en-US"/>
           </a:p>
@@ -679,7 +679,7 @@
           <a:p>
             <a:fld id="{DC1B431B-AAC3-1A49-9FAA-44192FD8B1A5}" type="datetimeFigureOut">
               <a:rPr kumimoji="1" lang="ja-JP" altLang="en-US" smtClean="0"/>
-              <a:t>2019/2/15</a:t>
+              <a:t>2019/2/16</a:t>
             </a:fld>
             <a:endParaRPr kumimoji="1" lang="ja-JP" altLang="en-US"/>
           </a:p>
@@ -884,7 +884,7 @@
           <a:p>
             <a:fld id="{DC1B431B-AAC3-1A49-9FAA-44192FD8B1A5}" type="datetimeFigureOut">
               <a:rPr kumimoji="1" lang="ja-JP" altLang="en-US" smtClean="0"/>
-              <a:t>2019/2/15</a:t>
+              <a:t>2019/2/16</a:t>
             </a:fld>
             <a:endParaRPr kumimoji="1" lang="ja-JP" altLang="en-US"/>
           </a:p>
@@ -1194,7 +1194,7 @@
           <a:p>
             <a:fld id="{DC1B431B-AAC3-1A49-9FAA-44192FD8B1A5}" type="datetimeFigureOut">
               <a:rPr kumimoji="1" lang="ja-JP" altLang="en-US" smtClean="0"/>
-              <a:t>2019/2/15</a:t>
+              <a:t>2019/2/16</a:t>
             </a:fld>
             <a:endParaRPr kumimoji="1" lang="ja-JP" altLang="en-US"/>
           </a:p>
@@ -1473,7 +1473,7 @@
           <a:p>
             <a:fld id="{DC1B431B-AAC3-1A49-9FAA-44192FD8B1A5}" type="datetimeFigureOut">
               <a:rPr kumimoji="1" lang="ja-JP" altLang="en-US" smtClean="0"/>
-              <a:t>2019/2/15</a:t>
+              <a:t>2019/2/16</a:t>
             </a:fld>
             <a:endParaRPr kumimoji="1" lang="ja-JP" altLang="en-US"/>
           </a:p>
@@ -1969,7 +1969,7 @@
           <a:p>
             <a:fld id="{DC1B431B-AAC3-1A49-9FAA-44192FD8B1A5}" type="datetimeFigureOut">
               <a:rPr kumimoji="1" lang="ja-JP" altLang="en-US" smtClean="0"/>
-              <a:t>2019/2/15</a:t>
+              <a:t>2019/2/16</a:t>
             </a:fld>
             <a:endParaRPr kumimoji="1" lang="ja-JP" altLang="en-US"/>
           </a:p>
@@ -2110,7 +2110,7 @@
           <a:p>
             <a:fld id="{DC1B431B-AAC3-1A49-9FAA-44192FD8B1A5}" type="datetimeFigureOut">
               <a:rPr kumimoji="1" lang="ja-JP" altLang="en-US" smtClean="0"/>
-              <a:t>2019/2/15</a:t>
+              <a:t>2019/2/16</a:t>
             </a:fld>
             <a:endParaRPr kumimoji="1" lang="ja-JP" altLang="en-US"/>
           </a:p>
@@ -2223,7 +2223,7 @@
           <a:p>
             <a:fld id="{DC1B431B-AAC3-1A49-9FAA-44192FD8B1A5}" type="datetimeFigureOut">
               <a:rPr kumimoji="1" lang="ja-JP" altLang="en-US" smtClean="0"/>
-              <a:t>2019/2/15</a:t>
+              <a:t>2019/2/16</a:t>
             </a:fld>
             <a:endParaRPr kumimoji="1" lang="ja-JP" altLang="en-US"/>
           </a:p>
@@ -2576,7 +2576,7 @@
           <a:p>
             <a:fld id="{DC1B431B-AAC3-1A49-9FAA-44192FD8B1A5}" type="datetimeFigureOut">
               <a:rPr kumimoji="1" lang="ja-JP" altLang="en-US" smtClean="0"/>
-              <a:t>2019/2/15</a:t>
+              <a:t>2019/2/16</a:t>
             </a:fld>
             <a:endParaRPr kumimoji="1" lang="ja-JP" altLang="en-US"/>
           </a:p>
@@ -2899,7 +2899,7 @@
           <a:p>
             <a:fld id="{DC1B431B-AAC3-1A49-9FAA-44192FD8B1A5}" type="datetimeFigureOut">
               <a:rPr kumimoji="1" lang="ja-JP" altLang="en-US" smtClean="0"/>
-              <a:t>2019/2/15</a:t>
+              <a:t>2019/2/16</a:t>
             </a:fld>
             <a:endParaRPr kumimoji="1" lang="ja-JP" altLang="en-US"/>
           </a:p>
@@ -3147,7 +3147,7 @@
           <a:p>
             <a:fld id="{DC1B431B-AAC3-1A49-9FAA-44192FD8B1A5}" type="datetimeFigureOut">
               <a:rPr kumimoji="1" lang="ja-JP" altLang="en-US" smtClean="0"/>
-              <a:t>2019/2/15</a:t>
+              <a:t>2019/2/16</a:t>
             </a:fld>
             <a:endParaRPr kumimoji="1" lang="ja-JP" altLang="en-US"/>
           </a:p>

</xml_diff>